<commit_message>
Pictures now have random example data
</commit_message>
<xml_diff>
--- a/slides/chapter_1_PET_intro.pptx
+++ b/slides/chapter_1_PET_intro.pptx
@@ -131,7 +131,7 @@
 <file path=ppt/revisionInfo.xml><?xml version="1.0" encoding="utf-8"?>
 <p1510:revInfo xmlns:a="http://schemas.openxmlformats.org/drawingml/2006/main" xmlns:r="http://schemas.openxmlformats.org/officeDocument/2006/relationships" xmlns:p1510="http://schemas.microsoft.com/office/powerpoint/2015/10/main">
   <p1510:revLst>
-    <p1510:client id="{0D8A4A48-2ABD-303D-69C4-60E1D9DD731A}" v="22" dt="2024-09-16T12:07:09.266"/>
+    <p1510:client id="{870F7C72-0806-179F-8D20-75886E1A9565}" v="39" dt="2024-09-25T11:51:09.557"/>
   </p1510:revLst>
 </p1510:revInfo>
 </file>
@@ -218,7 +218,7 @@
           <a:p>
             <a:fld id="{A3330743-5240-48A7-8B57-BC19A323DEAA}" type="datetimeFigureOut">
               <a:rPr lang="en-NL" smtClean="0"/>
-              <a:t>09/16/2024</a:t>
+              <a:t>09/25/2024</a:t>
             </a:fld>
             <a:endParaRPr lang="en-NL"/>
           </a:p>
@@ -797,7 +797,7 @@
           <a:p>
             <a:fld id="{C78DDFF4-2107-45FA-9BFB-5A681BB7B766}" type="slidenum">
               <a:rPr lang="en-GB" smtClean="0"/>
-              <a:t>9</a:t>
+              <a:t>11</a:t>
             </a:fld>
             <a:endParaRPr lang="en-GB"/>
           </a:p>
@@ -962,7 +962,7 @@
           <a:p>
             <a:fld id="{C78DDFF4-2107-45FA-9BFB-5A681BB7B766}" type="slidenum">
               <a:rPr lang="en-GB" smtClean="0"/>
-              <a:t>10</a:t>
+              <a:t>12</a:t>
             </a:fld>
             <a:endParaRPr lang="en-GB"/>
           </a:p>
@@ -1952,7 +1952,7 @@
           <a:p>
             <a:fld id="{C78DDFF4-2107-45FA-9BFB-5A681BB7B766}" type="slidenum">
               <a:rPr lang="en-GB" smtClean="0"/>
-              <a:t>9</a:t>
+              <a:t>8</a:t>
             </a:fld>
             <a:endParaRPr lang="en-GB"/>
           </a:p>
@@ -2117,7 +2117,7 @@
           <a:p>
             <a:fld id="{C78DDFF4-2107-45FA-9BFB-5A681BB7B766}" type="slidenum">
               <a:rPr lang="en-GB" smtClean="0"/>
-              <a:t>8</a:t>
+              <a:t>9</a:t>
             </a:fld>
             <a:endParaRPr lang="en-GB"/>
           </a:p>
@@ -2450,7 +2450,7 @@
           <a:p>
             <a:fld id="{F9076CC6-0B10-4E86-BD70-DFE29CA69112}" type="datetimeFigureOut">
               <a:rPr lang="en-NL" smtClean="0"/>
-              <a:t>09/16/2024</a:t>
+              <a:t>09/25/2024</a:t>
             </a:fld>
             <a:endParaRPr lang="en-NL"/>
           </a:p>
@@ -2621,7 +2621,7 @@
           <a:p>
             <a:fld id="{F9076CC6-0B10-4E86-BD70-DFE29CA69112}" type="datetimeFigureOut">
               <a:rPr lang="en-NL" smtClean="0"/>
-              <a:t>09/16/2024</a:t>
+              <a:t>09/25/2024</a:t>
             </a:fld>
             <a:endParaRPr lang="en-NL"/>
           </a:p>
@@ -2802,7 +2802,7 @@
           <a:p>
             <a:fld id="{F9076CC6-0B10-4E86-BD70-DFE29CA69112}" type="datetimeFigureOut">
               <a:rPr lang="en-NL" smtClean="0"/>
-              <a:t>09/16/2024</a:t>
+              <a:t>09/25/2024</a:t>
             </a:fld>
             <a:endParaRPr lang="en-NL"/>
           </a:p>
@@ -2973,7 +2973,7 @@
           <a:p>
             <a:fld id="{F9076CC6-0B10-4E86-BD70-DFE29CA69112}" type="datetimeFigureOut">
               <a:rPr lang="en-NL" smtClean="0"/>
-              <a:t>09/16/2024</a:t>
+              <a:t>09/25/2024</a:t>
             </a:fld>
             <a:endParaRPr lang="en-NL"/>
           </a:p>
@@ -3218,7 +3218,7 @@
           <a:p>
             <a:fld id="{F9076CC6-0B10-4E86-BD70-DFE29CA69112}" type="datetimeFigureOut">
               <a:rPr lang="en-NL" smtClean="0"/>
-              <a:t>09/16/2024</a:t>
+              <a:t>09/25/2024</a:t>
             </a:fld>
             <a:endParaRPr lang="en-NL"/>
           </a:p>
@@ -3457,7 +3457,7 @@
           <a:p>
             <a:fld id="{F9076CC6-0B10-4E86-BD70-DFE29CA69112}" type="datetimeFigureOut">
               <a:rPr lang="en-NL" smtClean="0"/>
-              <a:t>09/16/2024</a:t>
+              <a:t>09/25/2024</a:t>
             </a:fld>
             <a:endParaRPr lang="en-NL"/>
           </a:p>
@@ -3843,7 +3843,7 @@
           <a:p>
             <a:fld id="{F9076CC6-0B10-4E86-BD70-DFE29CA69112}" type="datetimeFigureOut">
               <a:rPr lang="en-NL" smtClean="0"/>
-              <a:t>09/16/2024</a:t>
+              <a:t>09/25/2024</a:t>
             </a:fld>
             <a:endParaRPr lang="en-NL"/>
           </a:p>
@@ -3956,7 +3956,7 @@
           <a:p>
             <a:fld id="{F9076CC6-0B10-4E86-BD70-DFE29CA69112}" type="datetimeFigureOut">
               <a:rPr lang="en-NL" smtClean="0"/>
-              <a:t>09/16/2024</a:t>
+              <a:t>09/25/2024</a:t>
             </a:fld>
             <a:endParaRPr lang="en-NL"/>
           </a:p>
@@ -4040,7 +4040,7 @@
           <a:p>
             <a:fld id="{F9076CC6-0B10-4E86-BD70-DFE29CA69112}" type="datetimeFigureOut">
               <a:rPr lang="en-NL" smtClean="0"/>
-              <a:t>09/16/2024</a:t>
+              <a:t>09/25/2024</a:t>
             </a:fld>
             <a:endParaRPr lang="en-NL"/>
           </a:p>
@@ -4324,7 +4324,7 @@
           <a:p>
             <a:fld id="{F9076CC6-0B10-4E86-BD70-DFE29CA69112}" type="datetimeFigureOut">
               <a:rPr lang="en-NL" smtClean="0"/>
-              <a:t>09/16/2024</a:t>
+              <a:t>09/25/2024</a:t>
             </a:fld>
             <a:endParaRPr lang="en-NL"/>
           </a:p>
@@ -4588,7 +4588,7 @@
           <a:p>
             <a:fld id="{F9076CC6-0B10-4E86-BD70-DFE29CA69112}" type="datetimeFigureOut">
               <a:rPr lang="en-NL" smtClean="0"/>
-              <a:t>09/16/2024</a:t>
+              <a:t>09/25/2024</a:t>
             </a:fld>
             <a:endParaRPr lang="en-NL"/>
           </a:p>
@@ -4800,7 +4800,7 @@
           <a:p>
             <a:fld id="{F9076CC6-0B10-4E86-BD70-DFE29CA69112}" type="datetimeFigureOut">
               <a:rPr lang="en-NL" smtClean="0"/>
-              <a:t>09/16/2024</a:t>
+              <a:t>09/25/2024</a:t>
             </a:fld>
             <a:endParaRPr lang="en-NL"/>
           </a:p>
@@ -5591,10 +5591,10 @@
       </p:sp>
       <p:pic>
         <p:nvPicPr>
-          <p:cNvPr id="3" name="Picture 2" descr="Differential privacy sometimes replaces a subset of the data with random values">
-            <a:extLst>
-              <a:ext uri="{FF2B5EF4-FFF2-40B4-BE49-F238E27FC236}">
-                <a16:creationId xmlns:a16="http://schemas.microsoft.com/office/drawing/2014/main" id="{A090CA72-0FBB-59F8-17AA-07728857EF40}"/>
+          <p:cNvPr id="4" name="Picture 3" descr="A diagram of a game&#10;&#10;Description automatically generated">
+            <a:extLst>
+              <a:ext uri="{FF2B5EF4-FFF2-40B4-BE49-F238E27FC236}">
+                <a16:creationId xmlns:a16="http://schemas.microsoft.com/office/drawing/2014/main" id="{386A0CA9-482A-5F4C-992E-80F38D15A55B}"/>
               </a:ext>
             </a:extLst>
           </p:cNvPr>
@@ -5611,8 +5611,8 @@
         </p:blipFill>
         <p:spPr>
           <a:xfrm>
-            <a:off x="1528550" y="1338191"/>
-            <a:ext cx="8714095" cy="4909498"/>
+            <a:off x="1186405" y="1208108"/>
+            <a:ext cx="9163291" cy="5107330"/>
           </a:xfrm>
           <a:prstGeom prst="rect">
             <a:avLst/>
@@ -5685,10 +5685,10 @@
       </p:sp>
       <p:pic>
         <p:nvPicPr>
-          <p:cNvPr id="4" name="Picture 3" descr="A pair of scissors cutting a partitioning chart&#10;&#10;Description automatically generated">
-            <a:extLst>
-              <a:ext uri="{FF2B5EF4-FFF2-40B4-BE49-F238E27FC236}">
-                <a16:creationId xmlns:a16="http://schemas.microsoft.com/office/drawing/2014/main" id="{4558A23D-AC36-87DE-049F-F602C07618BB}"/>
+          <p:cNvPr id="3" name="Picture 2" descr="A pair of scissors cutting a number&#10;&#10;Description automatically generated">
+            <a:extLst>
+              <a:ext uri="{FF2B5EF4-FFF2-40B4-BE49-F238E27FC236}">
+                <a16:creationId xmlns:a16="http://schemas.microsoft.com/office/drawing/2014/main" id="{C2197001-EA1D-A3D1-DB76-293066C559AE}"/>
               </a:ext>
             </a:extLst>
           </p:cNvPr>
@@ -5705,8 +5705,8 @@
         </p:blipFill>
         <p:spPr>
           <a:xfrm>
-            <a:off x="2013045" y="1106039"/>
-            <a:ext cx="8177283" cy="4645924"/>
+            <a:off x="1080304" y="1044133"/>
+            <a:ext cx="9047545" cy="5088038"/>
           </a:xfrm>
           <a:prstGeom prst="rect">
             <a:avLst/>
@@ -6525,10 +6525,10 @@
       </p:sp>
       <p:pic>
         <p:nvPicPr>
-          <p:cNvPr id="50" name="Picture 49">
-            <a:extLst>
-              <a:ext uri="{FF2B5EF4-FFF2-40B4-BE49-F238E27FC236}">
-                <a16:creationId xmlns:a16="http://schemas.microsoft.com/office/drawing/2014/main" id="{4E1C7BBE-D9F5-89DB-6731-CED6A9257514}"/>
+          <p:cNvPr id="3" name="Picture 2">
+            <a:extLst>
+              <a:ext uri="{FF2B5EF4-FFF2-40B4-BE49-F238E27FC236}">
+                <a16:creationId xmlns:a16="http://schemas.microsoft.com/office/drawing/2014/main" id="{3A4DA1C9-3B33-8B14-5D0F-88FF2B209FDB}"/>
               </a:ext>
             </a:extLst>
           </p:cNvPr>
@@ -6545,8 +6545,8 @@
         </p:blipFill>
         <p:spPr>
           <a:xfrm>
-            <a:off x="1629103" y="1202121"/>
-            <a:ext cx="8653516" cy="4891688"/>
+            <a:off x="1431637" y="1241136"/>
+            <a:ext cx="8990060" cy="5060757"/>
           </a:xfrm>
           <a:prstGeom prst="rect">
             <a:avLst/>
@@ -6630,10 +6630,10 @@
       </p:sp>
       <p:pic>
         <p:nvPicPr>
-          <p:cNvPr id="3" name="Picture 2">
-            <a:extLst>
-              <a:ext uri="{FF2B5EF4-FFF2-40B4-BE49-F238E27FC236}">
-                <a16:creationId xmlns:a16="http://schemas.microsoft.com/office/drawing/2014/main" id="{D5F4780E-B2F8-E8FE-44C3-E8C5C9C8345D}"/>
+          <p:cNvPr id="4" name="Picture 3" descr="A diagram of a number&#10;&#10;Description automatically generated">
+            <a:extLst>
+              <a:ext uri="{FF2B5EF4-FFF2-40B4-BE49-F238E27FC236}">
+                <a16:creationId xmlns:a16="http://schemas.microsoft.com/office/drawing/2014/main" id="{51468885-DC42-A7ED-54EE-1A945E41C1E0}"/>
               </a:ext>
             </a:extLst>
           </p:cNvPr>
@@ -6650,8 +6650,8 @@
         </p:blipFill>
         <p:spPr>
           <a:xfrm>
-            <a:off x="2005725" y="1438604"/>
-            <a:ext cx="8180551" cy="4655206"/>
+            <a:off x="1801091" y="1395076"/>
+            <a:ext cx="8597515" cy="4837545"/>
           </a:xfrm>
           <a:prstGeom prst="rect">
             <a:avLst/>
@@ -6735,10 +6735,10 @@
       </p:sp>
       <p:pic>
         <p:nvPicPr>
-          <p:cNvPr id="4" name="Picture 3">
-            <a:extLst>
-              <a:ext uri="{FF2B5EF4-FFF2-40B4-BE49-F238E27FC236}">
-                <a16:creationId xmlns:a16="http://schemas.microsoft.com/office/drawing/2014/main" id="{FAF03EA4-009A-CED1-A9F2-78293128C243}"/>
+          <p:cNvPr id="3" name="Picture 2" descr="A diagram of numbers and lines&#10;&#10;Description automatically generated">
+            <a:extLst>
+              <a:ext uri="{FF2B5EF4-FFF2-40B4-BE49-F238E27FC236}">
+                <a16:creationId xmlns:a16="http://schemas.microsoft.com/office/drawing/2014/main" id="{ADDB017B-531E-DDD8-282F-321BD4D748E8}"/>
               </a:ext>
             </a:extLst>
           </p:cNvPr>
@@ -6755,8 +6755,8 @@
         </p:blipFill>
         <p:spPr>
           <a:xfrm>
-            <a:off x="1646622" y="1263432"/>
-            <a:ext cx="8452069" cy="4760311"/>
+            <a:off x="1639747" y="1429956"/>
+            <a:ext cx="8179443" cy="4567177"/>
           </a:xfrm>
           <a:prstGeom prst="rect">
             <a:avLst/>
@@ -6840,10 +6840,10 @@
       </p:sp>
       <p:pic>
         <p:nvPicPr>
-          <p:cNvPr id="3" name="Picture 2" descr="A diagram of a algorithm&#10;&#10;Description automatically generated">
-            <a:extLst>
-              <a:ext uri="{FF2B5EF4-FFF2-40B4-BE49-F238E27FC236}">
-                <a16:creationId xmlns:a16="http://schemas.microsoft.com/office/drawing/2014/main" id="{210159B4-6B2A-1674-17E9-34A78C020278}"/>
+          <p:cNvPr id="4" name="Picture 3" descr="A diagram of a algorithm&#10;&#10;Description automatically generated">
+            <a:extLst>
+              <a:ext uri="{FF2B5EF4-FFF2-40B4-BE49-F238E27FC236}">
+                <a16:creationId xmlns:a16="http://schemas.microsoft.com/office/drawing/2014/main" id="{613480AF-67D8-57D8-E9F9-18D14E46EE5B}"/>
               </a:ext>
             </a:extLst>
           </p:cNvPr>
@@ -6860,8 +6860,8 @@
         </p:blipFill>
         <p:spPr>
           <a:xfrm>
-            <a:off x="1830552" y="1333500"/>
-            <a:ext cx="8180551" cy="4602655"/>
+            <a:off x="1643669" y="1102960"/>
+            <a:ext cx="9529822" cy="5319531"/>
           </a:xfrm>
           <a:prstGeom prst="rect">
             <a:avLst/>
@@ -7044,10 +7044,10 @@
       </p:sp>
       <p:pic>
         <p:nvPicPr>
-          <p:cNvPr id="4" name="Picture 3" descr="A diagram of a mathematical equation&#10;&#10;Description automatically generated">
-            <a:extLst>
-              <a:ext uri="{FF2B5EF4-FFF2-40B4-BE49-F238E27FC236}">
-                <a16:creationId xmlns:a16="http://schemas.microsoft.com/office/drawing/2014/main" id="{1158810D-1ABA-E2E2-DEFD-AFF09476BDD6}"/>
+          <p:cNvPr id="3" name="Picture 2" descr="A diagram of a mathematical equation&#10;&#10;Description automatically generated">
+            <a:extLst>
+              <a:ext uri="{FF2B5EF4-FFF2-40B4-BE49-F238E27FC236}">
+                <a16:creationId xmlns:a16="http://schemas.microsoft.com/office/drawing/2014/main" id="{E7E1FA6E-A3C5-2E36-C825-8C444A577E38}"/>
               </a:ext>
             </a:extLst>
           </p:cNvPr>
@@ -7064,8 +7064,8 @@
         </p:blipFill>
         <p:spPr>
           <a:xfrm>
-            <a:off x="1629103" y="1237156"/>
-            <a:ext cx="8802413" cy="4900448"/>
+            <a:off x="1745848" y="1256335"/>
+            <a:ext cx="8420582" cy="4740797"/>
           </a:xfrm>
           <a:prstGeom prst="rect">
             <a:avLst/>
@@ -7789,15 +7789,6 @@
 </file>
 
 <file path=customXml/item1.xml><?xml version="1.0" encoding="utf-8"?>
-<?mso-contentType ?>
-<FormTemplates xmlns="http://schemas.microsoft.com/sharepoint/v3/contenttype/forms">
-  <Display>DocumentLibraryForm</Display>
-  <Edit>DocumentLibraryForm</Edit>
-  <New>DocumentLibraryForm</New>
-</FormTemplates>
-</file>
-
-<file path=customXml/item2.xml><?xml version="1.0" encoding="utf-8"?>
 <ct:contentTypeSchema xmlns:ct="http://schemas.microsoft.com/office/2006/metadata/contentType" xmlns:ma="http://schemas.microsoft.com/office/2006/metadata/properties/metaAttributes" ct:_="" ma:_="" ma:contentTypeName="Document" ma:contentTypeID="0x01010097164C23EC47024F97AA423E75479F12" ma:contentTypeVersion="18" ma:contentTypeDescription="Create a new document." ma:contentTypeScope="" ma:versionID="108453ed9b46aec3b70b3a9a4d9bd7ac">
   <xsd:schema xmlns:xsd="http://www.w3.org/2001/XMLSchema" xmlns:xs="http://www.w3.org/2001/XMLSchema" xmlns:p="http://schemas.microsoft.com/office/2006/metadata/properties" xmlns:ns2="af34c8a9-9806-44d6-aa44-d772f2793323" xmlns:ns3="26898810-f9b9-406f-8188-8f8f7cdf5520" targetNamespace="http://schemas.microsoft.com/office/2006/metadata/properties" ma:root="true" ma:fieldsID="52bb5089fb0674458b27754d2b24d983" ns2:_="" ns3:_="">
     <xsd:import namespace="af34c8a9-9806-44d6-aa44-d772f2793323"/>
@@ -8046,15 +8037,16 @@
 </ct:contentTypeSchema>
 </file>
 
-<file path=customXml/itemProps1.xml><?xml version="1.0" encoding="utf-8"?>
-<ds:datastoreItem xmlns:ds="http://schemas.openxmlformats.org/officeDocument/2006/customXml" ds:itemID="{38C92116-0E62-45E4-A606-D334EE2D2ADE}">
-  <ds:schemaRefs>
-    <ds:schemaRef ds:uri="http://schemas.microsoft.com/sharepoint/v3/contenttype/forms"/>
-  </ds:schemaRefs>
-</ds:datastoreItem>
+<file path=customXml/item2.xml><?xml version="1.0" encoding="utf-8"?>
+<?mso-contentType ?>
+<FormTemplates xmlns="http://schemas.microsoft.com/sharepoint/v3/contenttype/forms">
+  <Display>DocumentLibraryForm</Display>
+  <Edit>DocumentLibraryForm</Edit>
+  <New>DocumentLibraryForm</New>
+</FormTemplates>
 </file>
 
-<file path=customXml/itemProps2.xml><?xml version="1.0" encoding="utf-8"?>
+<file path=customXml/itemProps1.xml><?xml version="1.0" encoding="utf-8"?>
 <ds:datastoreItem xmlns:ds="http://schemas.openxmlformats.org/officeDocument/2006/customXml" ds:itemID="{9D7DDECB-4DB6-4FC7-872F-1054CABC7EED}">
   <ds:schemaRefs>
     <ds:schemaRef ds:uri="http://schemas.microsoft.com/office/2006/metadata/contentType"/>
@@ -8071,4 +8063,12 @@
     <ds:schemaRef ds:uri="http://schemas.microsoft.com/internal/obd"/>
   </ds:schemaRefs>
 </ds:datastoreItem>
+</file>
+
+<file path=customXml/itemProps2.xml><?xml version="1.0" encoding="utf-8"?>
+<ds:datastoreItem xmlns:ds="http://schemas.openxmlformats.org/officeDocument/2006/customXml" ds:itemID="{38C92116-0E62-45E4-A606-D334EE2D2ADE}">
+  <ds:schemaRefs>
+    <ds:schemaRef ds:uri="http://schemas.microsoft.com/sharepoint/v3/contenttype/forms"/>
+  </ds:schemaRefs>
+</ds:datastoreItem>
 </file>
</xml_diff>